<commit_message>
thesis lecture and notes
</commit_message>
<xml_diff>
--- a/rhe306-spring2014/documents/thesisLecture.pptx
+++ b/rhe306-spring2014/documents/thesisLecture.pptx
@@ -5,7 +5,7 @@
     <p:sldMasterId id="2147483924" r:id="rId1"/>
   </p:sldMasterIdLst>
   <p:notesMasterIdLst>
-    <p:notesMasterId r:id="rId22"/>
+    <p:notesMasterId r:id="rId23"/>
   </p:notesMasterIdLst>
   <p:sldIdLst>
     <p:sldId id="256" r:id="rId2"/>
@@ -17,17 +17,18 @@
     <p:sldId id="283" r:id="rId8"/>
     <p:sldId id="284" r:id="rId9"/>
     <p:sldId id="285" r:id="rId10"/>
-    <p:sldId id="286" r:id="rId11"/>
-    <p:sldId id="287" r:id="rId12"/>
-    <p:sldId id="288" r:id="rId13"/>
-    <p:sldId id="289" r:id="rId14"/>
-    <p:sldId id="290" r:id="rId15"/>
-    <p:sldId id="291" r:id="rId16"/>
-    <p:sldId id="292" r:id="rId17"/>
-    <p:sldId id="293" r:id="rId18"/>
-    <p:sldId id="294" r:id="rId19"/>
-    <p:sldId id="295" r:id="rId20"/>
-    <p:sldId id="277" r:id="rId21"/>
+    <p:sldId id="296" r:id="rId11"/>
+    <p:sldId id="286" r:id="rId12"/>
+    <p:sldId id="287" r:id="rId13"/>
+    <p:sldId id="288" r:id="rId14"/>
+    <p:sldId id="289" r:id="rId15"/>
+    <p:sldId id="290" r:id="rId16"/>
+    <p:sldId id="291" r:id="rId17"/>
+    <p:sldId id="292" r:id="rId18"/>
+    <p:sldId id="293" r:id="rId19"/>
+    <p:sldId id="294" r:id="rId20"/>
+    <p:sldId id="295" r:id="rId21"/>
+    <p:sldId id="277" r:id="rId22"/>
   </p:sldIdLst>
   <p:sldSz cx="9144000" cy="6858000" type="screen4x3"/>
   <p:notesSz cx="6858000" cy="9144000"/>
@@ -211,7 +212,7 @@
           <a:p>
             <a:fld id="{C7D41FAA-B7A4-2E46-867F-180959296F4C}" type="datetimeFigureOut">
               <a:rPr lang="en-US" smtClean="0"/>
-              <a:t>3/16/14</a:t>
+              <a:t>3/18/14</a:t>
             </a:fld>
             <a:endParaRPr lang="en-US"/>
           </a:p>
@@ -479,6 +480,300 @@
 </p:notesMaster>
 </file>
 
+<file path=ppt/notesSlides/notesSlide1.xml><?xml version="1.0" encoding="utf-8"?>
+<p:notes xmlns:a="http://schemas.openxmlformats.org/drawingml/2006/main" xmlns:r="http://schemas.openxmlformats.org/officeDocument/2006/relationships" xmlns:p="http://schemas.openxmlformats.org/presentationml/2006/main">
+  <p:cSld>
+    <p:spTree>
+      <p:nvGrpSpPr>
+        <p:cNvPr id="1" name=""/>
+        <p:cNvGrpSpPr/>
+        <p:nvPr/>
+      </p:nvGrpSpPr>
+      <p:grpSpPr>
+        <a:xfrm>
+          <a:off x="0" y="0"/>
+          <a:ext cx="0" cy="0"/>
+          <a:chOff x="0" y="0"/>
+          <a:chExt cx="0" cy="0"/>
+        </a:xfrm>
+      </p:grpSpPr>
+      <p:sp>
+        <p:nvSpPr>
+          <p:cNvPr id="2" name="Slide Image Placeholder 1"/>
+          <p:cNvSpPr>
+            <a:spLocks noGrp="1" noRot="1" noChangeAspect="1"/>
+          </p:cNvSpPr>
+          <p:nvPr>
+            <p:ph type="sldImg"/>
+          </p:nvPr>
+        </p:nvSpPr>
+        <p:spPr/>
+      </p:sp>
+      <p:sp>
+        <p:nvSpPr>
+          <p:cNvPr id="3" name="Notes Placeholder 2"/>
+          <p:cNvSpPr>
+            <a:spLocks noGrp="1"/>
+          </p:cNvSpPr>
+          <p:nvPr>
+            <p:ph type="body" idx="1"/>
+          </p:nvPr>
+        </p:nvSpPr>
+        <p:spPr/>
+        <p:txBody>
+          <a:bodyPr/>
+          <a:lstStyle/>
+          <a:p>
+            <a:r>
+              <a:rPr lang="en-US" dirty="0" smtClean="0"/>
+              <a:t>Opening Bit: Obama</a:t>
+            </a:r>
+          </a:p>
+          <a:p>
+            <a:pPr marL="0" marR="0" indent="0" algn="l" defTabSz="457200" rtl="0" eaLnBrk="1" fontAlgn="auto" latinLnBrk="0" hangingPunct="1">
+              <a:lnSpc>
+                <a:spcPct val="100000"/>
+              </a:lnSpc>
+              <a:spcBef>
+                <a:spcPts val="0"/>
+              </a:spcBef>
+              <a:spcAft>
+                <a:spcPts val="0"/>
+              </a:spcAft>
+              <a:buClrTx/>
+              <a:buSzTx/>
+              <a:buFontTx/>
+              <a:buNone/>
+              <a:tabLst/>
+              <a:defRPr/>
+            </a:pPr>
+            <a:r>
+              <a:rPr lang="en-US" dirty="0" smtClean="0"/>
+              <a:t>Hangover</a:t>
+            </a:r>
+            <a:r>
+              <a:rPr lang="en-US" baseline="0" dirty="0" smtClean="0"/>
+              <a:t> Movie bit: 1:15</a:t>
+            </a:r>
+            <a:endParaRPr lang="en-US" dirty="0" smtClean="0"/>
+          </a:p>
+          <a:p>
+            <a:endParaRPr lang="en-US" dirty="0"/>
+          </a:p>
+        </p:txBody>
+      </p:sp>
+      <p:sp>
+        <p:nvSpPr>
+          <p:cNvPr id="4" name="Slide Number Placeholder 3"/>
+          <p:cNvSpPr>
+            <a:spLocks noGrp="1"/>
+          </p:cNvSpPr>
+          <p:nvPr>
+            <p:ph type="sldNum" sz="quarter" idx="10"/>
+          </p:nvPr>
+        </p:nvSpPr>
+        <p:spPr/>
+        <p:txBody>
+          <a:bodyPr/>
+          <a:lstStyle/>
+          <a:p>
+            <a:fld id="{DD3BD7E7-A791-E34D-8ACB-3FF9B0B3B6AE}" type="slidenum">
+              <a:rPr lang="en-US" smtClean="0"/>
+              <a:t>3</a:t>
+            </a:fld>
+            <a:endParaRPr lang="en-US"/>
+          </a:p>
+        </p:txBody>
+      </p:sp>
+    </p:spTree>
+    <p:extLst>
+      <p:ext uri="{BB962C8B-B14F-4D97-AF65-F5344CB8AC3E}">
+        <p14:creationId xmlns:p14="http://schemas.microsoft.com/office/powerpoint/2010/main" val="3121953576"/>
+      </p:ext>
+    </p:extLst>
+  </p:cSld>
+  <p:clrMapOvr>
+    <a:masterClrMapping/>
+  </p:clrMapOvr>
+</p:notes>
+</file>
+
+<file path=ppt/notesSlides/notesSlide2.xml><?xml version="1.0" encoding="utf-8"?>
+<p:notes xmlns:a="http://schemas.openxmlformats.org/drawingml/2006/main" xmlns:r="http://schemas.openxmlformats.org/officeDocument/2006/relationships" xmlns:p="http://schemas.openxmlformats.org/presentationml/2006/main">
+  <p:cSld>
+    <p:spTree>
+      <p:nvGrpSpPr>
+        <p:cNvPr id="1" name=""/>
+        <p:cNvGrpSpPr/>
+        <p:nvPr/>
+      </p:nvGrpSpPr>
+      <p:grpSpPr>
+        <a:xfrm>
+          <a:off x="0" y="0"/>
+          <a:ext cx="0" cy="0"/>
+          <a:chOff x="0" y="0"/>
+          <a:chExt cx="0" cy="0"/>
+        </a:xfrm>
+      </p:grpSpPr>
+      <p:sp>
+        <p:nvSpPr>
+          <p:cNvPr id="2" name="Slide Image Placeholder 1"/>
+          <p:cNvSpPr>
+            <a:spLocks noGrp="1" noRot="1" noChangeAspect="1"/>
+          </p:cNvSpPr>
+          <p:nvPr>
+            <p:ph type="sldImg"/>
+          </p:nvPr>
+        </p:nvSpPr>
+        <p:spPr/>
+      </p:sp>
+      <p:sp>
+        <p:nvSpPr>
+          <p:cNvPr id="3" name="Notes Placeholder 2"/>
+          <p:cNvSpPr>
+            <a:spLocks noGrp="1"/>
+          </p:cNvSpPr>
+          <p:nvPr>
+            <p:ph type="body" idx="1"/>
+          </p:nvPr>
+        </p:nvSpPr>
+        <p:spPr/>
+        <p:txBody>
+          <a:bodyPr/>
+          <a:lstStyle/>
+          <a:p>
+            <a:r>
+              <a:rPr lang="en-US" dirty="0" smtClean="0"/>
+              <a:t>Obama bit: 3:19</a:t>
+            </a:r>
+            <a:endParaRPr lang="en-US" dirty="0"/>
+          </a:p>
+        </p:txBody>
+      </p:sp>
+      <p:sp>
+        <p:nvSpPr>
+          <p:cNvPr id="4" name="Slide Number Placeholder 3"/>
+          <p:cNvSpPr>
+            <a:spLocks noGrp="1"/>
+          </p:cNvSpPr>
+          <p:nvPr>
+            <p:ph type="sldNum" sz="quarter" idx="10"/>
+          </p:nvPr>
+        </p:nvSpPr>
+        <p:spPr/>
+        <p:txBody>
+          <a:bodyPr/>
+          <a:lstStyle/>
+          <a:p>
+            <a:fld id="{DD3BD7E7-A791-E34D-8ACB-3FF9B0B3B6AE}" type="slidenum">
+              <a:rPr lang="en-US" smtClean="0"/>
+              <a:t>4</a:t>
+            </a:fld>
+            <a:endParaRPr lang="en-US"/>
+          </a:p>
+        </p:txBody>
+      </p:sp>
+    </p:spTree>
+    <p:extLst>
+      <p:ext uri="{BB962C8B-B14F-4D97-AF65-F5344CB8AC3E}">
+        <p14:creationId xmlns:p14="http://schemas.microsoft.com/office/powerpoint/2010/main" val="3210449163"/>
+      </p:ext>
+    </p:extLst>
+  </p:cSld>
+  <p:clrMapOvr>
+    <a:masterClrMapping/>
+  </p:clrMapOvr>
+</p:notes>
+</file>
+
+<file path=ppt/notesSlides/notesSlide3.xml><?xml version="1.0" encoding="utf-8"?>
+<p:notes xmlns:a="http://schemas.openxmlformats.org/drawingml/2006/main" xmlns:r="http://schemas.openxmlformats.org/officeDocument/2006/relationships" xmlns:p="http://schemas.openxmlformats.org/presentationml/2006/main">
+  <p:cSld>
+    <p:spTree>
+      <p:nvGrpSpPr>
+        <p:cNvPr id="1" name=""/>
+        <p:cNvGrpSpPr/>
+        <p:nvPr/>
+      </p:nvGrpSpPr>
+      <p:grpSpPr>
+        <a:xfrm>
+          <a:off x="0" y="0"/>
+          <a:ext cx="0" cy="0"/>
+          <a:chOff x="0" y="0"/>
+          <a:chExt cx="0" cy="0"/>
+        </a:xfrm>
+      </p:grpSpPr>
+      <p:sp>
+        <p:nvSpPr>
+          <p:cNvPr id="2" name="Slide Image Placeholder 1"/>
+          <p:cNvSpPr>
+            <a:spLocks noGrp="1" noRot="1" noChangeAspect="1"/>
+          </p:cNvSpPr>
+          <p:nvPr>
+            <p:ph type="sldImg"/>
+          </p:nvPr>
+        </p:nvSpPr>
+        <p:spPr/>
+      </p:sp>
+      <p:sp>
+        <p:nvSpPr>
+          <p:cNvPr id="3" name="Notes Placeholder 2"/>
+          <p:cNvSpPr>
+            <a:spLocks noGrp="1"/>
+          </p:cNvSpPr>
+          <p:nvPr>
+            <p:ph type="body" idx="1"/>
+          </p:nvPr>
+        </p:nvSpPr>
+        <p:spPr/>
+        <p:txBody>
+          <a:bodyPr/>
+          <a:lstStyle/>
+          <a:p>
+            <a:r>
+              <a:rPr lang="en-US" dirty="0" smtClean="0"/>
+              <a:t>Obama bit: 3:19.</a:t>
+            </a:r>
+            <a:endParaRPr lang="en-US" dirty="0"/>
+          </a:p>
+        </p:txBody>
+      </p:sp>
+      <p:sp>
+        <p:nvSpPr>
+          <p:cNvPr id="4" name="Slide Number Placeholder 3"/>
+          <p:cNvSpPr>
+            <a:spLocks noGrp="1"/>
+          </p:cNvSpPr>
+          <p:nvPr>
+            <p:ph type="sldNum" sz="quarter" idx="10"/>
+          </p:nvPr>
+        </p:nvSpPr>
+        <p:spPr/>
+        <p:txBody>
+          <a:bodyPr/>
+          <a:lstStyle/>
+          <a:p>
+            <a:fld id="{DD3BD7E7-A791-E34D-8ACB-3FF9B0B3B6AE}" type="slidenum">
+              <a:rPr lang="en-US" smtClean="0"/>
+              <a:t>5</a:t>
+            </a:fld>
+            <a:endParaRPr lang="en-US"/>
+          </a:p>
+        </p:txBody>
+      </p:sp>
+    </p:spTree>
+    <p:extLst>
+      <p:ext uri="{BB962C8B-B14F-4D97-AF65-F5344CB8AC3E}">
+        <p14:creationId xmlns:p14="http://schemas.microsoft.com/office/powerpoint/2010/main" val="3028012880"/>
+      </p:ext>
+    </p:extLst>
+  </p:cSld>
+  <p:clrMapOvr>
+    <a:masterClrMapping/>
+  </p:clrMapOvr>
+</p:notes>
+</file>
+
 <file path=ppt/slideLayouts/slideLayout1.xml><?xml version="1.0" encoding="utf-8"?>
 <p:sldLayout xmlns:a="http://schemas.openxmlformats.org/drawingml/2006/main" xmlns:r="http://schemas.openxmlformats.org/officeDocument/2006/relationships" xmlns:p="http://schemas.openxmlformats.org/presentationml/2006/main" showMasterSp="0" type="title" preserve="1">
   <p:cSld name="Title Slide">
@@ -760,7 +1055,7 @@
             <a:fld id="{451DEABC-D766-4322-8E78-B830FAE35C72}" type="datetime4">
               <a:rPr lang="en-US" smtClean="0"/>
               <a:pPr/>
-              <a:t>March 16, 2014</a:t>
+              <a:t>March 18, 2014</a:t>
             </a:fld>
             <a:endParaRPr lang="en-US" dirty="0"/>
           </a:p>
@@ -1155,7 +1450,7 @@
             <a:fld id="{F3131F9E-604E-4343-9F29-EF72E8231CAD}" type="datetime4">
               <a:rPr lang="en-US" smtClean="0"/>
               <a:pPr/>
-              <a:t>March 16, 2014</a:t>
+              <a:t>March 18, 2014</a:t>
             </a:fld>
             <a:endParaRPr lang="en-US"/>
           </a:p>
@@ -1690,7 +1985,7 @@
             <a:fld id="{34A8E1CE-37F8-4102-8DF9-852A0A51F293}" type="datetime4">
               <a:rPr lang="en-US" smtClean="0"/>
               <a:pPr/>
-              <a:t>March 16, 2014</a:t>
+              <a:t>March 18, 2014</a:t>
             </a:fld>
             <a:endParaRPr lang="en-US"/>
           </a:p>
@@ -1824,7 +2119,7 @@
             <a:fld id="{93333F43-3E86-47E4-BFBB-2476D384E1C6}" type="datetime4">
               <a:rPr lang="en-US" smtClean="0"/>
               <a:pPr/>
-              <a:t>March 16, 2014</a:t>
+              <a:t>March 18, 2014</a:t>
             </a:fld>
             <a:endParaRPr lang="en-US"/>
           </a:p>
@@ -2369,7 +2664,7 @@
             <a:fld id="{751663BA-01FC-4367-B6F3-ABB2645D55F1}" type="datetime4">
               <a:rPr lang="en-US" smtClean="0"/>
               <a:pPr/>
-              <a:t>March 16, 2014</a:t>
+              <a:t>March 18, 2014</a:t>
             </a:fld>
             <a:endParaRPr lang="en-US" dirty="0"/>
           </a:p>
@@ -2666,7 +2961,7 @@
             <a:fld id="{79B19C71-EC74-44AF-B27E-FC7DC3C3A61D}" type="datetime4">
               <a:rPr lang="en-US" smtClean="0"/>
               <a:pPr/>
-              <a:t>March 16, 2014</a:t>
+              <a:t>March 18, 2014</a:t>
             </a:fld>
             <a:endParaRPr lang="en-US"/>
           </a:p>
@@ -3327,7 +3622,7 @@
             <a:fld id="{6A5CDA29-3CBE-48EA-92AE-A996835462BA}" type="datetime4">
               <a:rPr lang="en-US" smtClean="0"/>
               <a:pPr/>
-              <a:t>March 16, 2014</a:t>
+              <a:t>March 18, 2014</a:t>
             </a:fld>
             <a:endParaRPr lang="en-US"/>
           </a:p>
@@ -3765,7 +4060,7 @@
             <a:fld id="{E29EC054-3869-4501-B163-1BBFDE8DCE04}" type="datetime4">
               <a:rPr lang="en-US" smtClean="0"/>
               <a:pPr/>
-              <a:t>March 16, 2014</a:t>
+              <a:t>March 18, 2014</a:t>
             </a:fld>
             <a:endParaRPr lang="en-US"/>
           </a:p>
@@ -4080,7 +4375,7 @@
             <a:fld id="{0A63D831-56C1-49CF-8EF7-8B9A98402BCD}" type="datetime4">
               <a:rPr lang="en-US" smtClean="0"/>
               <a:pPr/>
-              <a:t>March 16, 2014</a:t>
+              <a:t>March 18, 2014</a:t>
             </a:fld>
             <a:endParaRPr lang="en-US"/>
           </a:p>
@@ -4815,7 +5110,7 @@
             <a:fld id="{6EAD5615-7F4F-4584-84D5-CC95918C321F}" type="datetime4">
               <a:rPr lang="en-US" smtClean="0"/>
               <a:pPr/>
-              <a:t>March 16, 2014</a:t>
+              <a:t>March 18, 2014</a:t>
             </a:fld>
             <a:endParaRPr lang="en-US"/>
           </a:p>
@@ -5481,7 +5776,7 @@
             <a:fld id="{76EEA923-9BEE-48CE-9F28-5B525F399BAD}" type="datetime4">
               <a:rPr lang="en-US" smtClean="0"/>
               <a:pPr/>
-              <a:t>March 16, 2014</a:t>
+              <a:t>March 18, 2014</a:t>
             </a:fld>
             <a:endParaRPr lang="en-US"/>
           </a:p>
@@ -5755,7 +6050,7 @@
             <a:fld id="{17D0EFEE-2756-4A20-BF2A-63F0A94F99AC}" type="datetime4">
               <a:rPr lang="en-US" smtClean="0"/>
               <a:pPr/>
-              <a:t>March 16, 2014</a:t>
+              <a:t>March 18, 2014</a:t>
             </a:fld>
             <a:endParaRPr lang="en-US" dirty="0"/>
           </a:p>
@@ -6544,46 +6839,77 @@
           <a:p>
             <a:r>
               <a:rPr lang="en-US" dirty="0" smtClean="0"/>
-              <a:t>Sample Analysis: The Color Orange</a:t>
+              <a:t>Sample Analysis: Obama</a:t>
             </a:r>
             <a:endParaRPr lang="en-US" dirty="0"/>
           </a:p>
         </p:txBody>
       </p:sp>
-      <p:pic>
-        <p:nvPicPr>
-          <p:cNvPr id="4" name="Content Placeholder 3" descr="Screen Shot 2014-03-16 at 1.44.05 PM.png"/>
-          <p:cNvPicPr>
-            <a:picLocks noGrp="1" noChangeAspect="1"/>
-          </p:cNvPicPr>
+      <p:sp>
+        <p:nvSpPr>
+          <p:cNvPr id="3" name="Content Placeholder 2"/>
+          <p:cNvSpPr>
+            <a:spLocks noGrp="1"/>
+          </p:cNvSpPr>
           <p:nvPr>
             <p:ph sz="quarter" idx="1"/>
           </p:nvPr>
-        </p:nvPicPr>
-        <p:blipFill>
-          <a:blip r:embed="rId2">
-            <a:extLst>
-              <a:ext uri="{28A0092B-C50C-407E-A947-70E740481C1C}">
-                <a14:useLocalDpi xmlns:a14="http://schemas.microsoft.com/office/drawing/2010/main" val="0"/>
-              </a:ext>
-            </a:extLst>
-          </a:blip>
-          <a:srcRect l="-10940" r="-10940"/>
-          <a:stretch>
-            <a:fillRect/>
-          </a:stretch>
-        </p:blipFill>
-        <p:spPr>
-          <a:xfrm>
-            <a:off x="301625" y="1527175"/>
-            <a:ext cx="8504238" cy="4572000"/>
-          </a:xfrm>
-        </p:spPr>
-      </p:pic>
+        </p:nvSpPr>
+        <p:spPr/>
+        <p:txBody>
+          <a:bodyPr/>
+          <a:lstStyle/>
+          <a:p>
+            <a:r>
+              <a:rPr lang="en-US" dirty="0" smtClean="0"/>
+              <a:t>Claim: Obama uses the contrast between his situated ethos as president and his self-presentation as an ‘ordinary guy’ to establish authority.</a:t>
+            </a:r>
+          </a:p>
+          <a:p>
+            <a:pPr lvl="1"/>
+            <a:r>
+              <a:rPr lang="en-US" dirty="0" smtClean="0"/>
+              <a:t>Evidence 1: people watch this show?</a:t>
+            </a:r>
+          </a:p>
+          <a:p>
+            <a:pPr lvl="2"/>
+            <a:r>
+              <a:rPr lang="en-US" dirty="0" smtClean="0"/>
+              <a:t>Analysis: Calls the show stupid; implies that he’s stupid for watching the show; but we know he’s not stupid!</a:t>
+            </a:r>
+          </a:p>
+          <a:p>
+            <a:pPr lvl="1"/>
+            <a:r>
+              <a:rPr lang="en-US" dirty="0" smtClean="0"/>
+              <a:t>Evidence 2: the hangover movies</a:t>
+            </a:r>
+          </a:p>
+          <a:p>
+            <a:pPr lvl="2"/>
+            <a:r>
+              <a:rPr lang="en-US" dirty="0" smtClean="0"/>
+              <a:t>Analysis: Makes Zach seem stupid; establishes pop-culture knowledge; make self seem smart.</a:t>
+            </a:r>
+          </a:p>
+          <a:p>
+            <a:pPr lvl="1"/>
+            <a:r>
+              <a:rPr lang="en-US" dirty="0" smtClean="0"/>
+              <a:t>Analysis: In both cases, Obama makes fun of the context to make himself seem like an ordinary guy, but does so in a way that reasserts his intelligence and authority as president.</a:t>
+            </a:r>
+          </a:p>
+          <a:p>
+            <a:pPr lvl="2"/>
+            <a:endParaRPr lang="en-US" dirty="0"/>
+          </a:p>
+        </p:txBody>
+      </p:sp>
     </p:spTree>
     <p:extLst>
       <p:ext uri="{BB962C8B-B14F-4D97-AF65-F5344CB8AC3E}">
-        <p14:creationId xmlns:p14="http://schemas.microsoft.com/office/powerpoint/2010/main" val="855748086"/>
+        <p14:creationId xmlns:p14="http://schemas.microsoft.com/office/powerpoint/2010/main" val="585327997"/>
       </p:ext>
     </p:extLst>
   </p:cSld>
@@ -6612,6 +6938,89 @@
       </p:grpSpPr>
       <p:sp>
         <p:nvSpPr>
+          <p:cNvPr id="2" name="Title 1"/>
+          <p:cNvSpPr>
+            <a:spLocks noGrp="1"/>
+          </p:cNvSpPr>
+          <p:nvPr>
+            <p:ph type="title"/>
+          </p:nvPr>
+        </p:nvSpPr>
+        <p:spPr/>
+        <p:txBody>
+          <a:bodyPr/>
+          <a:lstStyle/>
+          <a:p>
+            <a:r>
+              <a:rPr lang="en-US" dirty="0" smtClean="0"/>
+              <a:t>Sample Analysis: The Color Orange</a:t>
+            </a:r>
+            <a:endParaRPr lang="en-US" dirty="0"/>
+          </a:p>
+        </p:txBody>
+      </p:sp>
+      <p:pic>
+        <p:nvPicPr>
+          <p:cNvPr id="4" name="Content Placeholder 3" descr="Screen Shot 2014-03-16 at 1.44.05 PM.png"/>
+          <p:cNvPicPr>
+            <a:picLocks noGrp="1" noChangeAspect="1"/>
+          </p:cNvPicPr>
+          <p:nvPr>
+            <p:ph sz="quarter" idx="1"/>
+          </p:nvPr>
+        </p:nvPicPr>
+        <p:blipFill>
+          <a:blip r:embed="rId2">
+            <a:extLst>
+              <a:ext uri="{28A0092B-C50C-407E-A947-70E740481C1C}">
+                <a14:useLocalDpi xmlns:a14="http://schemas.microsoft.com/office/drawing/2010/main" val="0"/>
+              </a:ext>
+            </a:extLst>
+          </a:blip>
+          <a:srcRect l="-10940" r="-10940"/>
+          <a:stretch>
+            <a:fillRect/>
+          </a:stretch>
+        </p:blipFill>
+        <p:spPr>
+          <a:xfrm>
+            <a:off x="301625" y="1527175"/>
+            <a:ext cx="8504238" cy="4572000"/>
+          </a:xfrm>
+        </p:spPr>
+      </p:pic>
+    </p:spTree>
+    <p:extLst>
+      <p:ext uri="{BB962C8B-B14F-4D97-AF65-F5344CB8AC3E}">
+        <p14:creationId xmlns:p14="http://schemas.microsoft.com/office/powerpoint/2010/main" val="855748086"/>
+      </p:ext>
+    </p:extLst>
+  </p:cSld>
+  <p:clrMapOvr>
+    <a:masterClrMapping/>
+  </p:clrMapOvr>
+</p:sld>
+</file>
+
+<file path=ppt/slides/slide12.xml><?xml version="1.0" encoding="utf-8"?>
+<p:sld xmlns:a="http://schemas.openxmlformats.org/drawingml/2006/main" xmlns:r="http://schemas.openxmlformats.org/officeDocument/2006/relationships" xmlns:p="http://schemas.openxmlformats.org/presentationml/2006/main">
+  <p:cSld>
+    <p:spTree>
+      <p:nvGrpSpPr>
+        <p:cNvPr id="1" name=""/>
+        <p:cNvGrpSpPr/>
+        <p:nvPr/>
+      </p:nvGrpSpPr>
+      <p:grpSpPr>
+        <a:xfrm>
+          <a:off x="0" y="0"/>
+          <a:ext cx="0" cy="0"/>
+          <a:chOff x="0" y="0"/>
+          <a:chExt cx="0" cy="0"/>
+        </a:xfrm>
+      </p:grpSpPr>
+      <p:sp>
+        <p:nvSpPr>
           <p:cNvPr id="2" name="Text Placeholder 1"/>
           <p:cNvSpPr>
             <a:spLocks noGrp="1"/>
@@ -6676,7 +7085,7 @@
 </p:sld>
 </file>
 
-<file path=ppt/slides/slide12.xml><?xml version="1.0" encoding="utf-8"?>
+<file path=ppt/slides/slide13.xml><?xml version="1.0" encoding="utf-8"?>
 <p:sld xmlns:a="http://schemas.openxmlformats.org/drawingml/2006/main" xmlns:r="http://schemas.openxmlformats.org/officeDocument/2006/relationships" xmlns:p="http://schemas.openxmlformats.org/presentationml/2006/main">
   <p:cSld>
     <p:spTree>
@@ -6902,7 +7311,7 @@
 </p:sld>
 </file>
 
-<file path=ppt/slides/slide13.xml><?xml version="1.0" encoding="utf-8"?>
+<file path=ppt/slides/slide14.xml><?xml version="1.0" encoding="utf-8"?>
 <p:sld xmlns:a="http://schemas.openxmlformats.org/drawingml/2006/main" xmlns:r="http://schemas.openxmlformats.org/officeDocument/2006/relationships" xmlns:p="http://schemas.openxmlformats.org/presentationml/2006/main">
   <p:cSld>
     <p:spTree>
@@ -6975,8 +7384,13 @@
             </a:pPr>
             <a:r>
               <a:rPr lang="en-US" dirty="0" smtClean="0"/>
-              <a:t>Answer the question asked by the paper</a:t>
-            </a:r>
+              <a:t>Answer the question asked by the </a:t>
+            </a:r>
+            <a:r>
+              <a:rPr lang="en-US" dirty="0" smtClean="0"/>
+              <a:t>assignment.</a:t>
+            </a:r>
+            <a:endParaRPr lang="en-US" dirty="0" smtClean="0"/>
           </a:p>
           <a:p>
             <a:pPr lvl="1">
@@ -7060,100 +7474,6 @@
 </p:sld>
 </file>
 
-<file path=ppt/slides/slide14.xml><?xml version="1.0" encoding="utf-8"?>
-<p:sld xmlns:a="http://schemas.openxmlformats.org/drawingml/2006/main" xmlns:r="http://schemas.openxmlformats.org/officeDocument/2006/relationships" xmlns:p="http://schemas.openxmlformats.org/presentationml/2006/main">
-  <p:cSld>
-    <p:spTree>
-      <p:nvGrpSpPr>
-        <p:cNvPr id="1" name=""/>
-        <p:cNvGrpSpPr/>
-        <p:nvPr/>
-      </p:nvGrpSpPr>
-      <p:grpSpPr>
-        <a:xfrm>
-          <a:off x="0" y="0"/>
-          <a:ext cx="0" cy="0"/>
-          <a:chOff x="0" y="0"/>
-          <a:chExt cx="0" cy="0"/>
-        </a:xfrm>
-      </p:grpSpPr>
-      <p:sp>
-        <p:nvSpPr>
-          <p:cNvPr id="2" name="Title 1"/>
-          <p:cNvSpPr>
-            <a:spLocks noGrp="1"/>
-          </p:cNvSpPr>
-          <p:nvPr>
-            <p:ph type="title"/>
-          </p:nvPr>
-        </p:nvSpPr>
-        <p:spPr/>
-        <p:txBody>
-          <a:bodyPr/>
-          <a:lstStyle/>
-          <a:p>
-            <a:r>
-              <a:rPr lang="en-US" dirty="0" smtClean="0"/>
-              <a:t>Sample Thesis 1</a:t>
-            </a:r>
-            <a:endParaRPr lang="en-US" dirty="0"/>
-          </a:p>
-        </p:txBody>
-      </p:sp>
-      <p:sp>
-        <p:nvSpPr>
-          <p:cNvPr id="3" name="Content Placeholder 2"/>
-          <p:cNvSpPr>
-            <a:spLocks noGrp="1"/>
-          </p:cNvSpPr>
-          <p:nvPr>
-            <p:ph sz="quarter" idx="1"/>
-          </p:nvPr>
-        </p:nvSpPr>
-        <p:spPr/>
-        <p:txBody>
-          <a:bodyPr/>
-          <a:lstStyle/>
-          <a:p>
-            <a:r>
-              <a:rPr lang="en-US" dirty="0"/>
-              <a:t>Because he is not a professional on the subject matter, </a:t>
-            </a:r>
-            <a:r>
-              <a:rPr lang="en-US" dirty="0" err="1"/>
-              <a:t>Tanguay</a:t>
-            </a:r>
-            <a:r>
-              <a:rPr lang="en-US" dirty="0"/>
-              <a:t> uses a close personal view to build credibility, relate to the audience, and create a more real context for the debate. This approach keeps the reader from questioning the integrity of the argument. </a:t>
-            </a:r>
-            <a:r>
-              <a:rPr lang="en-US" dirty="0" err="1"/>
-              <a:t>Tanguay</a:t>
-            </a:r>
-            <a:r>
-              <a:rPr lang="en-US" dirty="0"/>
-              <a:t> is thus able to present his subjective beliefs without being pulled back by the lack of empirical support.</a:t>
-            </a:r>
-          </a:p>
-          <a:p>
-            <a:endParaRPr lang="en-US" dirty="0"/>
-          </a:p>
-        </p:txBody>
-      </p:sp>
-    </p:spTree>
-    <p:extLst>
-      <p:ext uri="{BB962C8B-B14F-4D97-AF65-F5344CB8AC3E}">
-        <p14:creationId xmlns:p14="http://schemas.microsoft.com/office/powerpoint/2010/main" val="2518609677"/>
-      </p:ext>
-    </p:extLst>
-  </p:cSld>
-  <p:clrMapOvr>
-    <a:masterClrMapping/>
-  </p:clrMapOvr>
-</p:sld>
-</file>
-
 <file path=ppt/slides/slide15.xml><?xml version="1.0" encoding="utf-8"?>
 <p:sld xmlns:a="http://schemas.openxmlformats.org/drawingml/2006/main" xmlns:r="http://schemas.openxmlformats.org/officeDocument/2006/relationships" xmlns:p="http://schemas.openxmlformats.org/presentationml/2006/main">
   <p:cSld>
@@ -7188,7 +7508,7 @@
           <a:p>
             <a:r>
               <a:rPr lang="en-US" dirty="0" smtClean="0"/>
-              <a:t>Sample Thesis 2</a:t>
+              <a:t>Sample Thesis 1</a:t>
             </a:r>
             <a:endParaRPr lang="en-US" dirty="0"/>
           </a:p>
@@ -7211,15 +7531,34 @@
           <a:p>
             <a:r>
               <a:rPr lang="en-US" dirty="0"/>
-              <a:t>Food &amp; Water Europe uses the structure, style, and logical reasoning of a scientific peer reviewed article to establish an ethos of scientific credibility. However their uses of emotional appeals and language reveals they are writing to persuade a non-scientific audience that a regulatory control method would be better suited for controlling emissions then emissions trading.</a:t>
-            </a:r>
+              <a:t>Because he is not a professional on the subject matter, </a:t>
+            </a:r>
+            <a:r>
+              <a:rPr lang="en-US" dirty="0" err="1"/>
+              <a:t>Tanguay</a:t>
+            </a:r>
+            <a:r>
+              <a:rPr lang="en-US" dirty="0"/>
+              <a:t> uses a close personal view to build credibility, relate to the audience, and create a more real context for the debate. This approach keeps the reader from questioning the integrity of the argument. </a:t>
+            </a:r>
+            <a:r>
+              <a:rPr lang="en-US" dirty="0" err="1"/>
+              <a:t>Tanguay</a:t>
+            </a:r>
+            <a:r>
+              <a:rPr lang="en-US" dirty="0"/>
+              <a:t> is thus able to present his subjective beliefs without being pulled back by the lack of empirical support.</a:t>
+            </a:r>
+          </a:p>
+          <a:p>
+            <a:endParaRPr lang="en-US" dirty="0"/>
           </a:p>
         </p:txBody>
       </p:sp>
     </p:spTree>
     <p:extLst>
       <p:ext uri="{BB962C8B-B14F-4D97-AF65-F5344CB8AC3E}">
-        <p14:creationId xmlns:p14="http://schemas.microsoft.com/office/powerpoint/2010/main" val="2435262840"/>
+        <p14:creationId xmlns:p14="http://schemas.microsoft.com/office/powerpoint/2010/main" val="2518609677"/>
       </p:ext>
     </p:extLst>
   </p:cSld>
@@ -7263,6 +7602,81 @@
           <a:p>
             <a:r>
               <a:rPr lang="en-US" dirty="0" smtClean="0"/>
+              <a:t>Sample Thesis 2</a:t>
+            </a:r>
+            <a:endParaRPr lang="en-US" dirty="0"/>
+          </a:p>
+        </p:txBody>
+      </p:sp>
+      <p:sp>
+        <p:nvSpPr>
+          <p:cNvPr id="3" name="Content Placeholder 2"/>
+          <p:cNvSpPr>
+            <a:spLocks noGrp="1"/>
+          </p:cNvSpPr>
+          <p:nvPr>
+            <p:ph sz="quarter" idx="1"/>
+          </p:nvPr>
+        </p:nvSpPr>
+        <p:spPr/>
+        <p:txBody>
+          <a:bodyPr/>
+          <a:lstStyle/>
+          <a:p>
+            <a:r>
+              <a:rPr lang="en-US" dirty="0"/>
+              <a:t>Food &amp; Water Europe uses the structure, style, and logical reasoning of a scientific peer reviewed article to establish an ethos of scientific credibility. However their uses of emotional appeals and language reveals they are writing to persuade a non-scientific audience that a regulatory control method would be better suited for controlling emissions then emissions trading.</a:t>
+            </a:r>
+          </a:p>
+        </p:txBody>
+      </p:sp>
+    </p:spTree>
+    <p:extLst>
+      <p:ext uri="{BB962C8B-B14F-4D97-AF65-F5344CB8AC3E}">
+        <p14:creationId xmlns:p14="http://schemas.microsoft.com/office/powerpoint/2010/main" val="2435262840"/>
+      </p:ext>
+    </p:extLst>
+  </p:cSld>
+  <p:clrMapOvr>
+    <a:masterClrMapping/>
+  </p:clrMapOvr>
+</p:sld>
+</file>
+
+<file path=ppt/slides/slide17.xml><?xml version="1.0" encoding="utf-8"?>
+<p:sld xmlns:a="http://schemas.openxmlformats.org/drawingml/2006/main" xmlns:r="http://schemas.openxmlformats.org/officeDocument/2006/relationships" xmlns:p="http://schemas.openxmlformats.org/presentationml/2006/main">
+  <p:cSld>
+    <p:spTree>
+      <p:nvGrpSpPr>
+        <p:cNvPr id="1" name=""/>
+        <p:cNvGrpSpPr/>
+        <p:nvPr/>
+      </p:nvGrpSpPr>
+      <p:grpSpPr>
+        <a:xfrm>
+          <a:off x="0" y="0"/>
+          <a:ext cx="0" cy="0"/>
+          <a:chOff x="0" y="0"/>
+          <a:chExt cx="0" cy="0"/>
+        </a:xfrm>
+      </p:grpSpPr>
+      <p:sp>
+        <p:nvSpPr>
+          <p:cNvPr id="2" name="Title 1"/>
+          <p:cNvSpPr>
+            <a:spLocks noGrp="1"/>
+          </p:cNvSpPr>
+          <p:nvPr>
+            <p:ph type="title"/>
+          </p:nvPr>
+        </p:nvSpPr>
+        <p:spPr/>
+        <p:txBody>
+          <a:bodyPr/>
+          <a:lstStyle/>
+          <a:p>
+            <a:r>
+              <a:rPr lang="en-US" dirty="0" smtClean="0"/>
               <a:t>The Thesis Formula</a:t>
             </a:r>
             <a:endParaRPr lang="en-US" dirty="0"/>
@@ -7320,7 +7734,7 @@
 </p:sld>
 </file>
 
-<file path=ppt/slides/slide17.xml><?xml version="1.0" encoding="utf-8"?>
+<file path=ppt/slides/slide18.xml><?xml version="1.0" encoding="utf-8"?>
 <p:sld xmlns:a="http://schemas.openxmlformats.org/drawingml/2006/main" xmlns:r="http://schemas.openxmlformats.org/officeDocument/2006/relationships" xmlns:p="http://schemas.openxmlformats.org/presentationml/2006/main">
   <p:cSld>
     <p:spTree>
@@ -7398,122 +7812,6 @@
 </p:sld>
 </file>
 
-<file path=ppt/slides/slide18.xml><?xml version="1.0" encoding="utf-8"?>
-<p:sld xmlns:a="http://schemas.openxmlformats.org/drawingml/2006/main" xmlns:r="http://schemas.openxmlformats.org/officeDocument/2006/relationships" xmlns:p="http://schemas.openxmlformats.org/presentationml/2006/main">
-  <p:cSld>
-    <p:spTree>
-      <p:nvGrpSpPr>
-        <p:cNvPr id="1" name=""/>
-        <p:cNvGrpSpPr/>
-        <p:nvPr/>
-      </p:nvGrpSpPr>
-      <p:grpSpPr>
-        <a:xfrm>
-          <a:off x="0" y="0"/>
-          <a:ext cx="0" cy="0"/>
-          <a:chOff x="0" y="0"/>
-          <a:chExt cx="0" cy="0"/>
-        </a:xfrm>
-      </p:grpSpPr>
-      <p:sp>
-        <p:nvSpPr>
-          <p:cNvPr id="2" name="Title 1"/>
-          <p:cNvSpPr>
-            <a:spLocks noGrp="1"/>
-          </p:cNvSpPr>
-          <p:nvPr>
-            <p:ph type="title"/>
-          </p:nvPr>
-        </p:nvSpPr>
-        <p:spPr/>
-        <p:txBody>
-          <a:bodyPr/>
-          <a:lstStyle/>
-          <a:p>
-            <a:r>
-              <a:rPr lang="en-US" dirty="0" smtClean="0"/>
-              <a:t>Introduction Formula</a:t>
-            </a:r>
-            <a:endParaRPr lang="en-US" dirty="0"/>
-          </a:p>
-        </p:txBody>
-      </p:sp>
-      <p:sp>
-        <p:nvSpPr>
-          <p:cNvPr id="3" name="Content Placeholder 2"/>
-          <p:cNvSpPr>
-            <a:spLocks noGrp="1"/>
-          </p:cNvSpPr>
-          <p:nvPr>
-            <p:ph sz="quarter" idx="1"/>
-          </p:nvPr>
-        </p:nvSpPr>
-        <p:spPr/>
-        <p:txBody>
-          <a:bodyPr/>
-          <a:lstStyle/>
-          <a:p>
-            <a:pPr>
-              <a:lnSpc>
-                <a:spcPct val="150000"/>
-              </a:lnSpc>
-            </a:pPr>
-            <a:r>
-              <a:rPr lang="en-US" dirty="0" smtClean="0"/>
-              <a:t>Attention Grabber: “Dramatic demand for energy!”</a:t>
-            </a:r>
-          </a:p>
-          <a:p>
-            <a:pPr>
-              <a:lnSpc>
-                <a:spcPct val="150000"/>
-              </a:lnSpc>
-            </a:pPr>
-            <a:r>
-              <a:rPr lang="en-US" dirty="0" smtClean="0"/>
-              <a:t>Background Info: Introduce controversy &amp; article</a:t>
-            </a:r>
-          </a:p>
-          <a:p>
-            <a:pPr>
-              <a:lnSpc>
-                <a:spcPct val="150000"/>
-              </a:lnSpc>
-            </a:pPr>
-            <a:r>
-              <a:rPr lang="en-US" dirty="0" smtClean="0"/>
-              <a:t>Thesis: 1-2 sentences, “I argue that…”</a:t>
-            </a:r>
-          </a:p>
-          <a:p>
-            <a:pPr>
-              <a:lnSpc>
-                <a:spcPct val="150000"/>
-              </a:lnSpc>
-            </a:pPr>
-            <a:r>
-              <a:rPr lang="en-US" dirty="0" smtClean="0"/>
-              <a:t>Signals: What your essay is going to do.</a:t>
-            </a:r>
-          </a:p>
-          <a:p>
-            <a:endParaRPr lang="en-US" dirty="0"/>
-          </a:p>
-        </p:txBody>
-      </p:sp>
-    </p:spTree>
-    <p:extLst>
-      <p:ext uri="{BB962C8B-B14F-4D97-AF65-F5344CB8AC3E}">
-        <p14:creationId xmlns:p14="http://schemas.microsoft.com/office/powerpoint/2010/main" val="4123383391"/>
-      </p:ext>
-    </p:extLst>
-  </p:cSld>
-  <p:clrMapOvr>
-    <a:masterClrMapping/>
-  </p:clrMapOvr>
-</p:sld>
-</file>
-
 <file path=ppt/slides/slide19.xml><?xml version="1.0" encoding="utf-8"?>
 <p:sld xmlns:a="http://schemas.openxmlformats.org/drawingml/2006/main" xmlns:r="http://schemas.openxmlformats.org/officeDocument/2006/relationships" xmlns:p="http://schemas.openxmlformats.org/presentationml/2006/main">
   <p:cSld>
@@ -7548,7 +7846,7 @@
           <a:p>
             <a:r>
               <a:rPr lang="en-US" dirty="0" smtClean="0"/>
-              <a:t>Essay Two Outline</a:t>
+              <a:t>Introduction Formula</a:t>
             </a:r>
             <a:endParaRPr lang="en-US" dirty="0"/>
           </a:p>
@@ -7569,63 +7867,50 @@
           <a:bodyPr/>
           <a:lstStyle/>
           <a:p>
+            <a:pPr>
+              <a:lnSpc>
+                <a:spcPct val="150000"/>
+              </a:lnSpc>
+            </a:pPr>
             <a:r>
               <a:rPr lang="en-US" dirty="0" smtClean="0"/>
-              <a:t>Introduction: thesis</a:t>
-            </a:r>
-          </a:p>
-          <a:p>
+              <a:t>Attention Grabber: “Dramatic demand for energy!”</a:t>
+            </a:r>
+          </a:p>
+          <a:p>
+            <a:pPr>
+              <a:lnSpc>
+                <a:spcPct val="150000"/>
+              </a:lnSpc>
+            </a:pPr>
             <a:r>
               <a:rPr lang="en-US" dirty="0" smtClean="0"/>
-              <a:t>Context: </a:t>
-            </a:r>
-          </a:p>
-          <a:p>
-            <a:pPr lvl="1"/>
+              <a:t>Background Info: Introduce controversy &amp; article</a:t>
+            </a:r>
+          </a:p>
+          <a:p>
+            <a:pPr>
+              <a:lnSpc>
+                <a:spcPct val="150000"/>
+              </a:lnSpc>
+            </a:pPr>
             <a:r>
               <a:rPr lang="en-US" dirty="0" smtClean="0"/>
-              <a:t>where, when, who, etc.: Claim, evidence, analysis</a:t>
-            </a:r>
-          </a:p>
-          <a:p>
+              <a:t>Thesis: 1-2 sentences, “I argue that…”</a:t>
+            </a:r>
+          </a:p>
+          <a:p>
+            <a:pPr>
+              <a:lnSpc>
+                <a:spcPct val="150000"/>
+              </a:lnSpc>
+            </a:pPr>
             <a:r>
               <a:rPr lang="en-US" dirty="0" smtClean="0"/>
-              <a:t>Analysis:</a:t>
-            </a:r>
-          </a:p>
-          <a:p>
-            <a:pPr lvl="1"/>
-            <a:r>
-              <a:rPr lang="en-US" dirty="0" smtClean="0"/>
-              <a:t>Strategy 1: claim, evidence, analysis</a:t>
-            </a:r>
-          </a:p>
-          <a:p>
-            <a:pPr lvl="1"/>
-            <a:r>
-              <a:rPr lang="en-US" dirty="0" smtClean="0"/>
-              <a:t>Strategy 2: claim, evidence, analysis</a:t>
-            </a:r>
-          </a:p>
-          <a:p>
-            <a:pPr lvl="1"/>
-            <a:r>
-              <a:rPr lang="en-US" dirty="0" smtClean="0"/>
-              <a:t>Strategy 3 claim, evidence, analysis</a:t>
-            </a:r>
-          </a:p>
-          <a:p>
-            <a:pPr lvl="1"/>
-            <a:r>
-              <a:rPr lang="en-US" dirty="0" smtClean="0"/>
-              <a:t>Etc.</a:t>
-            </a:r>
-          </a:p>
-          <a:p>
-            <a:r>
-              <a:rPr lang="en-US" dirty="0" smtClean="0"/>
-              <a:t>Conclusion: recap, evaluation</a:t>
-            </a:r>
+              <a:t>Signals: What your essay is going to do.</a:t>
+            </a:r>
+          </a:p>
+          <a:p>
             <a:endParaRPr lang="en-US" dirty="0"/>
           </a:p>
         </p:txBody>
@@ -7633,7 +7918,7 @@
     </p:spTree>
     <p:extLst>
       <p:ext uri="{BB962C8B-B14F-4D97-AF65-F5344CB8AC3E}">
-        <p14:creationId xmlns:p14="http://schemas.microsoft.com/office/powerpoint/2010/main" val="3936225402"/>
+        <p14:creationId xmlns:p14="http://schemas.microsoft.com/office/powerpoint/2010/main" val="4123383391"/>
       </p:ext>
     </p:extLst>
   </p:cSld>
@@ -7768,6 +8053,135 @@
       </p:grpSpPr>
       <p:sp>
         <p:nvSpPr>
+          <p:cNvPr id="2" name="Title 1"/>
+          <p:cNvSpPr>
+            <a:spLocks noGrp="1"/>
+          </p:cNvSpPr>
+          <p:nvPr>
+            <p:ph type="title"/>
+          </p:nvPr>
+        </p:nvSpPr>
+        <p:spPr/>
+        <p:txBody>
+          <a:bodyPr/>
+          <a:lstStyle/>
+          <a:p>
+            <a:r>
+              <a:rPr lang="en-US" dirty="0" smtClean="0"/>
+              <a:t>Essay Two Outline</a:t>
+            </a:r>
+            <a:endParaRPr lang="en-US" dirty="0"/>
+          </a:p>
+        </p:txBody>
+      </p:sp>
+      <p:sp>
+        <p:nvSpPr>
+          <p:cNvPr id="3" name="Content Placeholder 2"/>
+          <p:cNvSpPr>
+            <a:spLocks noGrp="1"/>
+          </p:cNvSpPr>
+          <p:nvPr>
+            <p:ph sz="quarter" idx="1"/>
+          </p:nvPr>
+        </p:nvSpPr>
+        <p:spPr/>
+        <p:txBody>
+          <a:bodyPr/>
+          <a:lstStyle/>
+          <a:p>
+            <a:r>
+              <a:rPr lang="en-US" dirty="0" smtClean="0"/>
+              <a:t>Introduction: thesis</a:t>
+            </a:r>
+          </a:p>
+          <a:p>
+            <a:r>
+              <a:rPr lang="en-US" dirty="0" smtClean="0"/>
+              <a:t>Context: </a:t>
+            </a:r>
+          </a:p>
+          <a:p>
+            <a:pPr lvl="1"/>
+            <a:r>
+              <a:rPr lang="en-US" dirty="0" smtClean="0"/>
+              <a:t>where, when, who, etc.: Claim, evidence, analysis</a:t>
+            </a:r>
+          </a:p>
+          <a:p>
+            <a:r>
+              <a:rPr lang="en-US" dirty="0" smtClean="0"/>
+              <a:t>Analysis:</a:t>
+            </a:r>
+          </a:p>
+          <a:p>
+            <a:pPr lvl="1"/>
+            <a:r>
+              <a:rPr lang="en-US" dirty="0" smtClean="0"/>
+              <a:t>Strategy 1: claim, evidence, analysis</a:t>
+            </a:r>
+          </a:p>
+          <a:p>
+            <a:pPr lvl="1"/>
+            <a:r>
+              <a:rPr lang="en-US" dirty="0" smtClean="0"/>
+              <a:t>Strategy 2: claim, evidence, analysis</a:t>
+            </a:r>
+          </a:p>
+          <a:p>
+            <a:pPr lvl="1"/>
+            <a:r>
+              <a:rPr lang="en-US" dirty="0" smtClean="0"/>
+              <a:t>Strategy 3 claim, evidence, analysis</a:t>
+            </a:r>
+          </a:p>
+          <a:p>
+            <a:pPr lvl="1"/>
+            <a:r>
+              <a:rPr lang="en-US" dirty="0" smtClean="0"/>
+              <a:t>Etc.</a:t>
+            </a:r>
+          </a:p>
+          <a:p>
+            <a:r>
+              <a:rPr lang="en-US" dirty="0" smtClean="0"/>
+              <a:t>Conclusion: recap, evaluation</a:t>
+            </a:r>
+            <a:endParaRPr lang="en-US" dirty="0"/>
+          </a:p>
+        </p:txBody>
+      </p:sp>
+    </p:spTree>
+    <p:extLst>
+      <p:ext uri="{BB962C8B-B14F-4D97-AF65-F5344CB8AC3E}">
+        <p14:creationId xmlns:p14="http://schemas.microsoft.com/office/powerpoint/2010/main" val="3936225402"/>
+      </p:ext>
+    </p:extLst>
+  </p:cSld>
+  <p:clrMapOvr>
+    <a:masterClrMapping/>
+  </p:clrMapOvr>
+</p:sld>
+</file>
+
+<file path=ppt/slides/slide21.xml><?xml version="1.0" encoding="utf-8"?>
+<p:sld xmlns:a="http://schemas.openxmlformats.org/drawingml/2006/main" xmlns:r="http://schemas.openxmlformats.org/officeDocument/2006/relationships" xmlns:p="http://schemas.openxmlformats.org/presentationml/2006/main">
+  <p:cSld>
+    <p:spTree>
+      <p:nvGrpSpPr>
+        <p:cNvPr id="1" name=""/>
+        <p:cNvGrpSpPr/>
+        <p:nvPr/>
+      </p:nvGrpSpPr>
+      <p:grpSpPr>
+        <a:xfrm>
+          <a:off x="0" y="0"/>
+          <a:ext cx="0" cy="0"/>
+          <a:chOff x="0" y="0"/>
+          <a:chExt cx="0" cy="0"/>
+        </a:xfrm>
+      </p:grpSpPr>
+      <p:sp>
+        <p:nvSpPr>
           <p:cNvPr id="2" name="Text Placeholder 1"/>
           <p:cNvSpPr>
             <a:spLocks noGrp="1"/>
@@ -7801,25 +8215,13 @@
                   <a:srgbClr val="D16349"/>
                 </a:solidFill>
               </a:rPr>
-              <a:t>Conducting </a:t>
-            </a:r>
-            <a:r>
-              <a:rPr lang="en-US" i="1" dirty="0" smtClean="0">
-                <a:solidFill>
-                  <a:srgbClr val="D16349"/>
-                </a:solidFill>
-              </a:rPr>
-              <a:t>Analysis</a:t>
+              <a:t>Conducting Analysis</a:t>
             </a:r>
           </a:p>
           <a:p>
             <a:r>
               <a:rPr lang="en-US" i="1" dirty="0" smtClean="0"/>
-              <a:t>Authority: Situated ethos, invented ethos, </a:t>
-            </a:r>
-            <a:r>
-              <a:rPr lang="en-US" i="1" dirty="0" smtClean="0"/>
-              <a:t>commonplaces</a:t>
+              <a:t>Authority: Situated ethos, invented ethos, commonplaces</a:t>
             </a:r>
             <a:endParaRPr lang="en-US" dirty="0"/>
           </a:p>
@@ -7839,11 +8241,7 @@
           <a:p>
             <a:r>
               <a:rPr lang="en-US" dirty="0" smtClean="0"/>
-              <a:t>Arguable &amp; Worth Arguing </a:t>
-            </a:r>
-            <a:r>
-              <a:rPr lang="en-US" dirty="0" smtClean="0"/>
-              <a:t>About</a:t>
+              <a:t>Arguable &amp; Worth Arguing About</a:t>
             </a:r>
           </a:p>
           <a:p>
@@ -8602,13 +9000,13 @@
         <p:spPr/>
         <p:txBody>
           <a:bodyPr>
-            <a:normAutofit fontScale="92500" lnSpcReduction="20000"/>
+            <a:normAutofit lnSpcReduction="10000"/>
           </a:bodyPr>
           <a:lstStyle/>
           <a:p>
             <a:r>
               <a:rPr lang="en-US" dirty="0"/>
-              <a:t>Another way in which </a:t>
+              <a:t>Randy </a:t>
             </a:r>
             <a:r>
               <a:rPr lang="en-US" dirty="0" err="1"/>
@@ -8616,7 +9014,7 @@
             </a:r>
             <a:r>
               <a:rPr lang="en-US" dirty="0"/>
-              <a:t> establishes authority is by stating that he is the decision maker on whether or not to recruit a player. He mentions how a donor has come up to him in the past and asked why he didn’t sign a young athlete. He then said that he won’t sign a young player if he hasn’t seen a transcript to verify the player’s grades or if he hasn’t seen film of the athlete in action. </a:t>
+              <a:t> establishes authority from the very beginning of the video when he mentions the words “our profession.” He explains why he is disappointed with how his profession recruits young athletes. The simple statement establishing his career shows that he isn’t just a random person talking on the subject of recruitment, but instead he is knowledgeable and informed. This establishes authority because the audience knows that </a:t>
             </a:r>
             <a:r>
               <a:rPr lang="en-US" dirty="0" err="1"/>
@@ -8624,34 +9022,12 @@
             </a:r>
             <a:r>
               <a:rPr lang="en-US" dirty="0"/>
-              <a:t> establishes </a:t>
-            </a:r>
-            <a:r>
-              <a:rPr lang="en-US" dirty="0" smtClean="0"/>
-              <a:t>authority over others</a:t>
+              <a:t> is knowledgeable since his career directly deals with recruitment of athletes. Knowledge, in turn, becomes power, which is a form of authority.</a:t>
             </a:r>
             <a:r>
               <a:rPr lang="en-US" dirty="0"/>
-              <a:t>’ </a:t>
-            </a:r>
-            <a:r>
-              <a:rPr lang="en-US" dirty="0" smtClean="0"/>
-              <a:t>influences [in] </a:t>
-            </a:r>
-            <a:r>
-              <a:rPr lang="en-US" dirty="0"/>
-              <a:t>the recruitment process </a:t>
-            </a:r>
-            <a:r>
-              <a:rPr lang="en-US" dirty="0" smtClean="0"/>
-              <a:t>. </a:t>
-            </a:r>
-            <a:r>
-              <a:rPr lang="en-US" dirty="0"/>
-              <a:t>Even though his funding comes from someone else, he doesn’t give in to what those people want. He knows he has the final say. This type of authority might appeal to other coaches, players, or families, especially those who agree that young athletes shouldn’t be recruited.</a:t>
-            </a:r>
-          </a:p>
-          <a:p>
+              <a:t> </a:t>
+            </a:r>
             <a:endParaRPr lang="en-US" dirty="0"/>
           </a:p>
         </p:txBody>

</xml_diff>